<commit_message>
vnf file add + journal
</commit_message>
<xml_diff>
--- a/Latex/tex1/proposal.pptx
+++ b/Latex/tex1/proposal.pptx
@@ -242,7 +242,7 @@
           <a:p>
             <a:fld id="{63335B88-4C89-4578-A075-4D3E83B0A887}" type="datetimeFigureOut">
               <a:rPr lang="en-US" smtClean="0"/>
-              <a:t>10/28/2020</a:t>
+              <a:t>11/9/2020</a:t>
             </a:fld>
             <a:endParaRPr lang="en-US"/>
           </a:p>
@@ -868,7 +868,7 @@
           <a:p>
             <a:fld id="{102FD3FC-A6A4-4BBE-88BE-C90E1A0B39F2}" type="datetime1">
               <a:rPr lang="en-US" smtClean="0"/>
-              <a:t>10/28/2020</a:t>
+              <a:t>11/9/2020</a:t>
             </a:fld>
             <a:endParaRPr lang="en-US" dirty="0"/>
           </a:p>
@@ -1277,7 +1277,7 @@
           <a:p>
             <a:fld id="{500EBF83-42AA-4080-A25F-B6C244B90351}" type="datetime1">
               <a:rPr lang="en-US" smtClean="0"/>
-              <a:t>10/28/2020</a:t>
+              <a:t>11/9/2020</a:t>
             </a:fld>
             <a:endParaRPr lang="en-US" dirty="0"/>
           </a:p>
@@ -1674,7 +1674,7 @@
           <a:p>
             <a:fld id="{F57CF355-3907-422E-8B7C-820CA8D6EB5A}" type="datetime1">
               <a:rPr lang="en-US" smtClean="0"/>
-              <a:t>10/28/2020</a:t>
+              <a:t>11/9/2020</a:t>
             </a:fld>
             <a:endParaRPr lang="en-US" dirty="0"/>
           </a:p>
@@ -2006,7 +2006,7 @@
           <a:p>
             <a:fld id="{DEF7EAC8-3EBA-4748-A303-26E90B6EDFEE}" type="datetime1">
               <a:rPr lang="en-US" smtClean="0"/>
-              <a:t>10/28/2020</a:t>
+              <a:t>11/9/2020</a:t>
             </a:fld>
             <a:endParaRPr lang="en-US" dirty="0"/>
           </a:p>
@@ -2322,7 +2322,7 @@
           <a:p>
             <a:fld id="{A10E341C-2FAB-4674-AAA6-D6DDC78F7006}" type="datetime1">
               <a:rPr lang="en-US" smtClean="0"/>
-              <a:t>10/28/2020</a:t>
+              <a:t>11/9/2020</a:t>
             </a:fld>
             <a:endParaRPr lang="en-US" dirty="0"/>
           </a:p>
@@ -2714,7 +2714,7 @@
           <a:p>
             <a:fld id="{20DDCB11-80C5-4728-9D44-8E5B7F9196EA}" type="datetime1">
               <a:rPr lang="en-US" smtClean="0"/>
-              <a:t>10/28/2020</a:t>
+              <a:t>11/9/2020</a:t>
             </a:fld>
             <a:endParaRPr lang="en-US" dirty="0"/>
           </a:p>
@@ -2967,7 +2967,7 @@
           <a:p>
             <a:fld id="{A2BC3563-488A-4932-8A59-4429075D34FD}" type="datetime1">
               <a:rPr lang="en-US" smtClean="0"/>
-              <a:t>10/28/2020</a:t>
+              <a:t>11/9/2020</a:t>
             </a:fld>
             <a:endParaRPr lang="en-US" dirty="0"/>
           </a:p>
@@ -3225,7 +3225,7 @@
           <a:p>
             <a:fld id="{F7627634-CF1B-46B3-8EE4-B644C9544DF0}" type="datetime1">
               <a:rPr lang="en-US" smtClean="0"/>
-              <a:t>10/28/2020</a:t>
+              <a:t>11/9/2020</a:t>
             </a:fld>
             <a:endParaRPr lang="en-US" dirty="0"/>
           </a:p>
@@ -3597,7 +3597,7 @@
           <a:p>
             <a:fld id="{767CFF7B-0BD2-4CF4-8D69-00C9D332468C}" type="datetime1">
               <a:rPr lang="en-US" smtClean="0"/>
-              <a:t>10/28/2020</a:t>
+              <a:t>11/9/2020</a:t>
             </a:fld>
             <a:endParaRPr lang="en-US" dirty="0"/>
           </a:p>
@@ -4002,7 +4002,7 @@
           <a:p>
             <a:fld id="{E051B3F5-C1AF-435D-B351-281A7B7E274E}" type="datetime1">
               <a:rPr lang="en-US" smtClean="0"/>
-              <a:t>10/28/2020</a:t>
+              <a:t>11/9/2020</a:t>
             </a:fld>
             <a:endParaRPr lang="en-US" dirty="0"/>
           </a:p>
@@ -4396,7 +4396,7 @@
           <a:p>
             <a:fld id="{46A6BAA6-6689-426B-A95A-C9488DDE3222}" type="datetime1">
               <a:rPr lang="en-US" smtClean="0"/>
-              <a:t>10/28/2020</a:t>
+              <a:t>11/9/2020</a:t>
             </a:fld>
             <a:endParaRPr lang="en-US" dirty="0"/>
           </a:p>
@@ -4909,7 +4909,7 @@
           <a:p>
             <a:fld id="{40113CE9-0FFC-41E9-9175-664E45580D83}" type="datetime1">
               <a:rPr lang="en-US" smtClean="0"/>
-              <a:t>10/28/2020</a:t>
+              <a:t>11/9/2020</a:t>
             </a:fld>
             <a:endParaRPr lang="en-US" dirty="0"/>
           </a:p>
@@ -5110,7 +5110,7 @@
           <a:p>
             <a:fld id="{8B917943-A53D-4690-9C64-999D3450F003}" type="datetime1">
               <a:rPr lang="en-US" smtClean="0"/>
-              <a:t>10/28/2020</a:t>
+              <a:t>11/9/2020</a:t>
             </a:fld>
             <a:endParaRPr lang="en-US" dirty="0"/>
           </a:p>
@@ -5348,7 +5348,7 @@
           <a:p>
             <a:fld id="{D0E93F5F-9FB5-4473-A087-BD864B1BF6AF}" type="datetime1">
               <a:rPr lang="en-US" smtClean="0"/>
-              <a:t>10/28/2020</a:t>
+              <a:t>11/9/2020</a:t>
             </a:fld>
             <a:endParaRPr lang="en-US" dirty="0"/>
           </a:p>
@@ -5677,7 +5677,7 @@
           <a:p>
             <a:fld id="{702B3A61-3CFA-45EC-B4D8-84D14B604D1A}" type="datetime1">
               <a:rPr lang="en-US" smtClean="0"/>
-              <a:t>10/28/2020</a:t>
+              <a:t>11/9/2020</a:t>
             </a:fld>
             <a:endParaRPr lang="en-US" dirty="0"/>
           </a:p>
@@ -6018,7 +6018,7 @@
           <a:p>
             <a:fld id="{C0008FC9-9451-4BE2-86BD-35D7F1634EFA}" type="datetime1">
               <a:rPr lang="en-US" smtClean="0"/>
-              <a:t>10/28/2020</a:t>
+              <a:t>11/9/2020</a:t>
             </a:fld>
             <a:endParaRPr lang="en-US" dirty="0"/>
           </a:p>
@@ -8131,7 +8131,7 @@
           <a:p>
             <a:fld id="{481B42E5-FAC4-415C-A1CC-C4AD5CD39577}" type="datetime1">
               <a:rPr lang="en-US" smtClean="0"/>
-              <a:t>10/28/2020</a:t>
+              <a:t>11/9/2020</a:t>
             </a:fld>
             <a:endParaRPr lang="en-US" dirty="0"/>
           </a:p>
@@ -10364,124 +10364,125 @@
         </p:nvSpPr>
         <p:spPr>
           <a:xfrm>
-            <a:off x="1143764" y="1382086"/>
-            <a:ext cx="9709435" cy="5084027"/>
+            <a:off x="1690755" y="1382086"/>
+            <a:ext cx="9162444" cy="4501879"/>
           </a:xfrm>
         </p:spPr>
         <p:txBody>
           <a:bodyPr>
-            <a:normAutofit fontScale="55000" lnSpcReduction="20000"/>
+            <a:normAutofit fontScale="77500" lnSpcReduction="20000"/>
           </a:bodyPr>
           <a:lstStyle/>
           <a:p>
             <a:r>
-              <a:rPr lang="ar-IQ" sz="3800" dirty="0"/>
+              <a:rPr lang="ar-IQ" sz="3100" dirty="0"/>
               <a:t>جداسازی المانهای نرم افزاری و سخت افزاری شبکه صورت</a:t>
             </a:r>
             <a:r>
-              <a:rPr lang="en-US" sz="3800" dirty="0"/>
+              <a:rPr lang="en-US" sz="3100" dirty="0"/>
               <a:t> </a:t>
             </a:r>
             <a:r>
-              <a:rPr lang="ar-IQ" sz="3800" dirty="0"/>
+              <a:rPr lang="ar-IQ" sz="3100" dirty="0"/>
               <a:t>گرفته است و به عنوان مجازی سازی توابع شبکه</a:t>
             </a:r>
             <a:r>
-              <a:rPr lang="en-US" sz="3800" dirty="0"/>
-              <a:t> (NFV)</a:t>
-            </a:r>
-            <a:r>
-              <a:rPr lang="ar-IQ" sz="3800" dirty="0"/>
+              <a:rPr lang="en-US" sz="3100" dirty="0"/>
+              <a:t> (</a:t>
+            </a:r>
+            <a:r>
+              <a:rPr lang="en-US" sz="2600" dirty="0"/>
+              <a:t>NFV</a:t>
+            </a:r>
+            <a:r>
+              <a:rPr lang="en-US" sz="3100" dirty="0"/>
+              <a:t>)</a:t>
+            </a:r>
+            <a:r>
+              <a:rPr lang="ar-IQ" sz="3100" dirty="0"/>
               <a:t>معرفی شده است </a:t>
             </a:r>
-            <a:endParaRPr lang="en-US" sz="3800" dirty="0"/>
-          </a:p>
-          <a:p>
-            <a:pPr marL="0" indent="0">
-              <a:buNone/>
-            </a:pPr>
-            <a:endParaRPr lang="en-US" sz="3800" dirty="0"/>
-          </a:p>
-          <a:p>
-            <a:r>
-              <a:rPr lang="ar-IQ" sz="3800" dirty="0"/>
+            <a:endParaRPr lang="en-US" sz="3100" dirty="0"/>
+          </a:p>
+          <a:p>
+            <a:r>
+              <a:rPr lang="ar-IQ" sz="3100" dirty="0"/>
               <a:t>توابع شبکه ی مجازی</a:t>
             </a:r>
             <a:r>
-              <a:rPr lang="en-US" sz="3800" dirty="0"/>
-              <a:t> VNF</a:t>
-            </a:r>
-            <a:r>
-              <a:rPr lang="ar-IQ" sz="3800" dirty="0"/>
+              <a:rPr lang="en-US" sz="3100" dirty="0"/>
+              <a:t> </a:t>
+            </a:r>
+            <a:r>
+              <a:rPr lang="en-US" sz="2600" dirty="0"/>
+              <a:t>VNF</a:t>
+            </a:r>
+            <a:r>
+              <a:rPr lang="ar-IQ" sz="3100" dirty="0"/>
               <a:t>بلوکهای توابع سیستم هستند </a:t>
             </a:r>
-            <a:endParaRPr lang="en-US" sz="3800" dirty="0"/>
-          </a:p>
-          <a:p>
-            <a:pPr marL="0" indent="0">
-              <a:buNone/>
-            </a:pPr>
-            <a:endParaRPr lang="en-US" sz="3800" dirty="0"/>
-          </a:p>
-          <a:p>
-            <a:r>
-              <a:rPr lang="ar-IQ" sz="3800" dirty="0"/>
-              <a:t>ایده اصلی </a:t>
-            </a:r>
-            <a:r>
-              <a:rPr lang="en-US" sz="3800" dirty="0"/>
+            <a:endParaRPr lang="en-US" sz="3100" dirty="0"/>
+          </a:p>
+          <a:p>
+            <a:r>
+              <a:rPr lang="ar-IQ" sz="3100" dirty="0"/>
+              <a:t>ایده اصلی</a:t>
+            </a:r>
+            <a:r>
+              <a:rPr lang="en-US" sz="2600" dirty="0"/>
               <a:t>NFV</a:t>
             </a:r>
             <a:r>
-              <a:rPr lang="ar-IQ" sz="3800" dirty="0"/>
+              <a:rPr lang="fa-IR" sz="3100" dirty="0"/>
+              <a:t> </a:t>
+            </a:r>
+            <a:r>
+              <a:rPr lang="ar-IQ" sz="3100" dirty="0"/>
               <a:t>جداسازی تجهیزات شبکه فیزیکی از توابع اجرا شده</a:t>
             </a:r>
             <a:r>
-              <a:rPr lang="fa-IR" sz="3800" dirty="0"/>
+              <a:rPr lang="fa-IR" sz="3100" dirty="0"/>
               <a:t> </a:t>
             </a:r>
             <a:r>
-              <a:rPr lang="ar-IQ" sz="3800" dirty="0"/>
+              <a:rPr lang="ar-IQ" sz="3100" dirty="0"/>
               <a:t>بر روی آنها است </a:t>
             </a:r>
-            <a:endParaRPr lang="en-US" sz="3800" dirty="0"/>
-          </a:p>
-          <a:p>
-            <a:endParaRPr lang="fa-IR" sz="3800" dirty="0"/>
-          </a:p>
-          <a:p>
-            <a:r>
-              <a:rPr lang="fa-IR" sz="3800" dirty="0"/>
+            <a:endParaRPr lang="fa-IR" sz="3100" dirty="0"/>
+          </a:p>
+          <a:p>
+            <a:r>
+              <a:rPr lang="fa-IR" sz="3100" dirty="0"/>
               <a:t>ویژگی های </a:t>
             </a:r>
             <a:r>
-              <a:rPr lang="en-US" sz="3800" dirty="0"/>
+              <a:rPr lang="en-US" sz="2600" dirty="0"/>
               <a:t>NFV</a:t>
             </a:r>
           </a:p>
           <a:p>
             <a:pPr lvl="1"/>
             <a:r>
-              <a:rPr lang="ar-IQ" sz="2600" dirty="0"/>
+              <a:rPr lang="ar-IQ" sz="2300" dirty="0"/>
               <a:t>جدا سازی بخش نرم افزار از سخت افزار</a:t>
             </a:r>
-            <a:endParaRPr lang="en-US" sz="2600" dirty="0"/>
+            <a:endParaRPr lang="en-US" sz="2300" dirty="0"/>
           </a:p>
           <a:p>
             <a:pPr lvl="1"/>
             <a:r>
-              <a:rPr lang="ar-IQ" sz="2600" dirty="0"/>
+              <a:rPr lang="ar-IQ" sz="2300" dirty="0"/>
               <a:t>استقرار عملکرد شبکه انعطاف پذیر </a:t>
             </a:r>
-            <a:endParaRPr lang="en-US" sz="2600" dirty="0"/>
+            <a:endParaRPr lang="en-US" sz="2300" dirty="0"/>
           </a:p>
           <a:p>
             <a:pPr lvl="1"/>
             <a:r>
-              <a:rPr lang="fa-IR" sz="2600" dirty="0"/>
+              <a:rPr lang="fa-IR" sz="2300" dirty="0"/>
               <a:t>مقیاس گذاری پویا</a:t>
             </a:r>
-            <a:endParaRPr lang="en-US" sz="2600" dirty="0"/>
+            <a:endParaRPr lang="en-US" sz="2300" dirty="0"/>
           </a:p>
           <a:p>
             <a:pPr marL="457200" lvl="1" indent="0">
@@ -11621,11 +11622,15 @@
             <a:pPr lvl="2"/>
             <a:r>
               <a:rPr lang="ar-IQ" dirty="0"/>
-              <a:t>یک سرویس مجموعه ای از ها </a:t>
+              <a:t>یک سرویس مجموعه ای از </a:t>
             </a:r>
             <a:r>
               <a:rPr lang="en-US" dirty="0"/>
               <a:t>VNF</a:t>
+            </a:r>
+            <a:r>
+              <a:rPr lang="fa-IR" dirty="0"/>
+              <a:t>ها </a:t>
             </a:r>
             <a:r>
               <a:rPr lang="ar-IQ" dirty="0"/>
@@ -11649,10 +11654,6 @@
           </a:p>
           <a:p>
             <a:pPr lvl="2"/>
-            <a:r>
-              <a:rPr lang="en-US" dirty="0"/>
-              <a:t>I</a:t>
-            </a:r>
             <a:r>
               <a:rPr lang="ar-IQ" dirty="0"/>
               <a:t>شامل اتصال شبکه بین مکانها، به عنوان مثال، بین مراکز داده</a:t>
@@ -11849,7 +11850,7 @@
         </p:nvSpPr>
         <p:spPr>
           <a:xfrm>
-            <a:off x="1687042" y="2107468"/>
+            <a:off x="1687042" y="1540189"/>
             <a:ext cx="8915400" cy="3777622"/>
           </a:xfrm>
         </p:spPr>
@@ -12678,8 +12679,12 @@
               <a:t>صورت پویا و کارآمد به برشهای شبکه منطقی با توجه به خواسته های </a:t>
             </a:r>
             <a:r>
-              <a:rPr lang="en-US" dirty="0" err="1"/>
+              <a:rPr lang="en-US" dirty="0"/>
               <a:t>QoS</a:t>
+            </a:r>
+            <a:r>
+              <a:rPr lang="fa-IR" dirty="0"/>
+              <a:t> </a:t>
             </a:r>
             <a:r>
               <a:rPr lang="ar-IQ" dirty="0"/>
@@ -18267,7 +18272,7 @@
         </p:blipFill>
         <p:spPr>
           <a:xfrm>
-            <a:off x="960981" y="4097131"/>
+            <a:off x="642114" y="3996218"/>
             <a:ext cx="5542189" cy="2431616"/>
           </a:xfrm>
           <a:prstGeom prst="rect">
@@ -18847,8 +18852,8 @@
           </a:p>
         </p:txBody>
       </p:sp>
-      <mc:AlternateContent xmlns:mc="http://schemas.openxmlformats.org/markup-compatibility/2006">
-        <mc:Choice xmlns:a14="http://schemas.microsoft.com/office/drawing/2010/main" Requires="a14">
+      <mc:AlternateContent xmlns:mc="http://schemas.openxmlformats.org/markup-compatibility/2006" xmlns:a14="http://schemas.microsoft.com/office/drawing/2010/main">
+        <mc:Choice Requires="a14">
           <p:sp>
             <p:nvSpPr>
               <p:cNvPr id="3" name="Content Placeholder 2"/>
@@ -19187,7 +19192,7 @@
             </p:txBody>
           </p:sp>
         </mc:Choice>
-        <mc:Fallback>
+        <mc:Fallback xmlns="">
           <p:sp>
             <p:nvSpPr>
               <p:cNvPr id="3" name="Content Placeholder 2"/>
@@ -19710,7 +19715,7 @@
           <a:graphicData uri="http://schemas.openxmlformats.org/presentationml/2006/ole">
             <mc:AlternateContent xmlns:mc="http://schemas.openxmlformats.org/markup-compatibility/2006">
               <mc:Choice xmlns:v="urn:schemas-microsoft-com:vml" Requires="v">
-                <p:oleObj spid="_x0000_s2063" name="PDF" r:id="rId4" imgW="0" imgH="360" progId="FoxitReader.Document">
+                <p:oleObj spid="_x0000_s2069" name="PDF" r:id="rId4" imgW="0" imgH="360" progId="FoxitReader.Document">
                   <p:embed/>
                 </p:oleObj>
               </mc:Choice>
@@ -20380,7 +20385,7 @@
         </p:blipFill>
         <p:spPr>
           <a:xfrm>
-            <a:off x="2315404" y="1404071"/>
+            <a:off x="1532953" y="1430508"/>
             <a:ext cx="3104736" cy="694000"/>
           </a:xfrm>
           <a:prstGeom prst="rect">
@@ -20410,7 +20415,7 @@
         </p:blipFill>
         <p:spPr>
           <a:xfrm>
-            <a:off x="2302582" y="2113150"/>
+            <a:off x="1552322" y="2150945"/>
             <a:ext cx="3981450" cy="857250"/>
           </a:xfrm>
           <a:prstGeom prst="rect">
@@ -20418,12 +20423,50 @@
           </a:prstGeom>
         </p:spPr>
       </p:pic>
+      <p:sp>
+        <p:nvSpPr>
+          <p:cNvPr id="15" name="Slide Number Placeholder 14">
+            <a:extLst>
+              <a:ext uri="{FF2B5EF4-FFF2-40B4-BE49-F238E27FC236}">
+                <a16:creationId xmlns:a16="http://schemas.microsoft.com/office/drawing/2014/main" id="{005B86CE-8F8A-42DB-85FB-4978F9E40879}"/>
+              </a:ext>
+            </a:extLst>
+          </p:cNvPr>
+          <p:cNvSpPr>
+            <a:spLocks noGrp="1"/>
+          </p:cNvSpPr>
+          <p:nvPr>
+            <p:ph type="sldNum" sz="quarter" idx="12"/>
+          </p:nvPr>
+        </p:nvSpPr>
+        <p:spPr/>
+        <p:txBody>
+          <a:bodyPr/>
+          <a:lstStyle/>
+          <a:p>
+            <a:fld id="{D57F1E4F-1CFF-5643-939E-217C01CDF565}" type="slidenum">
+              <a:rPr lang="en-US" smtClean="0"/>
+              <a:pPr/>
+              <a:t>25</a:t>
+            </a:fld>
+            <a:r>
+              <a:rPr lang="en-US"/>
+              <a:t>/</a:t>
+            </a:r>
+            <a:r>
+              <a:rPr lang="fa-IR"/>
+              <a:t>46</a:t>
+            </a:r>
+            <a:endParaRPr lang="en-US" dirty="0"/>
+          </a:p>
+        </p:txBody>
+      </p:sp>
       <p:pic>
         <p:nvPicPr>
-          <p:cNvPr id="13" name="Picture 12">
+          <p:cNvPr id="16" name="Picture 15">
             <a:extLst>
               <a:ext uri="{FF2B5EF4-FFF2-40B4-BE49-F238E27FC236}">
-                <a16:creationId xmlns:a16="http://schemas.microsoft.com/office/drawing/2014/main" id="{9D3F1DA6-8962-4056-806E-42A1D12F4E17}"/>
+                <a16:creationId xmlns:a16="http://schemas.microsoft.com/office/drawing/2014/main" id="{74C908C5-D1D3-42DF-9261-A6152896C3EA}"/>
               </a:ext>
             </a:extLst>
           </p:cNvPr>
@@ -20440,8 +20483,8 @@
         </p:blipFill>
         <p:spPr>
           <a:xfrm>
-            <a:off x="2315404" y="2985479"/>
-            <a:ext cx="5076825" cy="3476625"/>
+            <a:off x="1532953" y="6149307"/>
+            <a:ext cx="4991100" cy="466725"/>
           </a:xfrm>
           <a:prstGeom prst="rect">
             <a:avLst/>
@@ -20450,10 +20493,10 @@
       </p:pic>
       <p:pic>
         <p:nvPicPr>
-          <p:cNvPr id="14" name="Picture 13">
+          <p:cNvPr id="17" name="Picture 16">
             <a:extLst>
               <a:ext uri="{FF2B5EF4-FFF2-40B4-BE49-F238E27FC236}">
-                <a16:creationId xmlns:a16="http://schemas.microsoft.com/office/drawing/2014/main" id="{3EBC6ADF-1746-493A-882D-E21B5FFC9C6A}"/>
+                <a16:creationId xmlns:a16="http://schemas.microsoft.com/office/drawing/2014/main" id="{F538C848-0A47-41BB-AABD-CEC3A4B6908D}"/>
               </a:ext>
             </a:extLst>
           </p:cNvPr>
@@ -20470,52 +20513,14 @@
         </p:blipFill>
         <p:spPr>
           <a:xfrm>
-            <a:off x="6371329" y="5558807"/>
-            <a:ext cx="4314825" cy="409575"/>
+            <a:off x="1532953" y="3034632"/>
+            <a:ext cx="3790950" cy="3114675"/>
           </a:xfrm>
           <a:prstGeom prst="rect">
             <a:avLst/>
           </a:prstGeom>
         </p:spPr>
       </p:pic>
-      <p:sp>
-        <p:nvSpPr>
-          <p:cNvPr id="15" name="Slide Number Placeholder 14">
-            <a:extLst>
-              <a:ext uri="{FF2B5EF4-FFF2-40B4-BE49-F238E27FC236}">
-                <a16:creationId xmlns:a16="http://schemas.microsoft.com/office/drawing/2014/main" id="{005B86CE-8F8A-42DB-85FB-4978F9E40879}"/>
-              </a:ext>
-            </a:extLst>
-          </p:cNvPr>
-          <p:cNvSpPr>
-            <a:spLocks noGrp="1"/>
-          </p:cNvSpPr>
-          <p:nvPr>
-            <p:ph type="sldNum" sz="quarter" idx="12"/>
-          </p:nvPr>
-        </p:nvSpPr>
-        <p:spPr/>
-        <p:txBody>
-          <a:bodyPr/>
-          <a:lstStyle/>
-          <a:p>
-            <a:fld id="{D57F1E4F-1CFF-5643-939E-217C01CDF565}" type="slidenum">
-              <a:rPr lang="en-US" smtClean="0"/>
-              <a:pPr/>
-              <a:t>25</a:t>
-            </a:fld>
-            <a:r>
-              <a:rPr lang="en-US"/>
-              <a:t>/</a:t>
-            </a:r>
-            <a:r>
-              <a:rPr lang="fa-IR"/>
-              <a:t>46</a:t>
-            </a:r>
-            <a:endParaRPr lang="en-US" dirty="0"/>
-          </a:p>
-        </p:txBody>
-      </p:sp>
     </p:spTree>
     <p:extLst>
       <p:ext uri="{BB962C8B-B14F-4D97-AF65-F5344CB8AC3E}">
@@ -20869,66 +20874,6 @@
           </p:sp>
         </mc:Fallback>
       </mc:AlternateContent>
-      <p:pic>
-        <p:nvPicPr>
-          <p:cNvPr id="5" name="Picture 4">
-            <a:extLst>
-              <a:ext uri="{FF2B5EF4-FFF2-40B4-BE49-F238E27FC236}">
-                <a16:creationId xmlns:a16="http://schemas.microsoft.com/office/drawing/2014/main" id="{982C7AC8-CC37-494A-90F3-D0226C18D89B}"/>
-              </a:ext>
-            </a:extLst>
-          </p:cNvPr>
-          <p:cNvPicPr>
-            <a:picLocks noChangeAspect="1"/>
-          </p:cNvPicPr>
-          <p:nvPr/>
-        </p:nvPicPr>
-        <p:blipFill>
-          <a:blip r:embed="rId3"/>
-          <a:stretch>
-            <a:fillRect/>
-          </a:stretch>
-        </p:blipFill>
-        <p:spPr>
-          <a:xfrm>
-            <a:off x="2787650" y="2847975"/>
-            <a:ext cx="4533900" cy="581025"/>
-          </a:xfrm>
-          <a:prstGeom prst="rect">
-            <a:avLst/>
-          </a:prstGeom>
-        </p:spPr>
-      </p:pic>
-      <p:pic>
-        <p:nvPicPr>
-          <p:cNvPr id="6" name="Picture 5">
-            <a:extLst>
-              <a:ext uri="{FF2B5EF4-FFF2-40B4-BE49-F238E27FC236}">
-                <a16:creationId xmlns:a16="http://schemas.microsoft.com/office/drawing/2014/main" id="{7129B3C9-5B14-452F-BA31-349F22242223}"/>
-              </a:ext>
-            </a:extLst>
-          </p:cNvPr>
-          <p:cNvPicPr>
-            <a:picLocks noChangeAspect="1"/>
-          </p:cNvPicPr>
-          <p:nvPr/>
-        </p:nvPicPr>
-        <p:blipFill>
-          <a:blip r:embed="rId4"/>
-          <a:stretch>
-            <a:fillRect/>
-          </a:stretch>
-        </p:blipFill>
-        <p:spPr>
-          <a:xfrm>
-            <a:off x="2863850" y="4148746"/>
-            <a:ext cx="4457700" cy="771525"/>
-          </a:xfrm>
-          <a:prstGeom prst="rect">
-            <a:avLst/>
-          </a:prstGeom>
-        </p:spPr>
-      </p:pic>
       <p:sp>
         <p:nvSpPr>
           <p:cNvPr id="8" name="Rounded Rectangle 15">
@@ -21424,6 +21369,66 @@
           </a:p>
         </p:txBody>
       </p:sp>
+      <p:pic>
+        <p:nvPicPr>
+          <p:cNvPr id="4" name="Picture 3">
+            <a:extLst>
+              <a:ext uri="{FF2B5EF4-FFF2-40B4-BE49-F238E27FC236}">
+                <a16:creationId xmlns:a16="http://schemas.microsoft.com/office/drawing/2014/main" id="{ACD7BF43-E8C2-4570-A943-2E163819B03A}"/>
+              </a:ext>
+            </a:extLst>
+          </p:cNvPr>
+          <p:cNvPicPr>
+            <a:picLocks noChangeAspect="1"/>
+          </p:cNvPicPr>
+          <p:nvPr/>
+        </p:nvPicPr>
+        <p:blipFill>
+          <a:blip r:embed="rId3"/>
+          <a:stretch>
+            <a:fillRect/>
+          </a:stretch>
+        </p:blipFill>
+        <p:spPr>
+          <a:xfrm>
+            <a:off x="3237258" y="2882178"/>
+            <a:ext cx="4286250" cy="561975"/>
+          </a:xfrm>
+          <a:prstGeom prst="rect">
+            <a:avLst/>
+          </a:prstGeom>
+        </p:spPr>
+      </p:pic>
+      <p:pic>
+        <p:nvPicPr>
+          <p:cNvPr id="14" name="Picture 13">
+            <a:extLst>
+              <a:ext uri="{FF2B5EF4-FFF2-40B4-BE49-F238E27FC236}">
+                <a16:creationId xmlns:a16="http://schemas.microsoft.com/office/drawing/2014/main" id="{BA8151D5-0308-4628-B96F-80C3AB14AD12}"/>
+              </a:ext>
+            </a:extLst>
+          </p:cNvPr>
+          <p:cNvPicPr>
+            <a:picLocks noChangeAspect="1"/>
+          </p:cNvPicPr>
+          <p:nvPr/>
+        </p:nvPicPr>
+        <p:blipFill>
+          <a:blip r:embed="rId4"/>
+          <a:stretch>
+            <a:fillRect/>
+          </a:stretch>
+        </p:blipFill>
+        <p:spPr>
+          <a:xfrm>
+            <a:off x="3237259" y="4027634"/>
+            <a:ext cx="4647578" cy="781050"/>
+          </a:xfrm>
+          <a:prstGeom prst="rect">
+            <a:avLst/>
+          </a:prstGeom>
+        </p:spPr>
+      </p:pic>
     </p:spTree>
     <p:extLst>
       <p:ext uri="{BB962C8B-B14F-4D97-AF65-F5344CB8AC3E}">
@@ -21511,7 +21516,7 @@
           <a:p>
             <a:r>
               <a:rPr lang="fa-IR" dirty="0"/>
-              <a:t>پردازش باند پایه هر ،</a:t>
+              <a:t>پردازش باند پایه هر</a:t>
             </a:r>
             <a:r>
               <a:rPr lang="en-US" dirty="0"/>
@@ -21519,7 +21524,7 @@
             </a:r>
             <a:r>
               <a:rPr lang="fa-IR" dirty="0"/>
-              <a:t>بوسیله ی پردازش صف </a:t>
+              <a:t> بوسیله ی پردازش صف </a:t>
             </a:r>
             <a:r>
               <a:rPr lang="en-US" dirty="0"/>
@@ -21659,7 +21664,7 @@
         </p:blipFill>
         <p:spPr>
           <a:xfrm>
-            <a:off x="6417859" y="5001907"/>
+            <a:off x="6679797" y="4839122"/>
             <a:ext cx="2314575" cy="695325"/>
           </a:xfrm>
           <a:prstGeom prst="rect">
@@ -21689,7 +21694,7 @@
         </p:blipFill>
         <p:spPr>
           <a:xfrm>
-            <a:off x="1448204" y="2654675"/>
+            <a:off x="1310409" y="2442906"/>
             <a:ext cx="2514600" cy="466725"/>
           </a:xfrm>
           <a:prstGeom prst="rect">
@@ -22252,6 +22257,36 @@
           </a:p>
         </p:txBody>
       </p:sp>
+      <p:pic>
+        <p:nvPicPr>
+          <p:cNvPr id="18" name="Picture 17">
+            <a:extLst>
+              <a:ext uri="{FF2B5EF4-FFF2-40B4-BE49-F238E27FC236}">
+                <a16:creationId xmlns:a16="http://schemas.microsoft.com/office/drawing/2014/main" id="{E6C5A48F-3159-4274-B127-CA495F10A71A}"/>
+              </a:ext>
+            </a:extLst>
+          </p:cNvPr>
+          <p:cNvPicPr>
+            <a:picLocks noChangeAspect="1"/>
+          </p:cNvPicPr>
+          <p:nvPr/>
+        </p:nvPicPr>
+        <p:blipFill>
+          <a:blip r:embed="rId8"/>
+          <a:stretch>
+            <a:fillRect/>
+          </a:stretch>
+        </p:blipFill>
+        <p:spPr>
+          <a:xfrm>
+            <a:off x="310949" y="4729758"/>
+            <a:ext cx="6334772" cy="1761147"/>
+          </a:xfrm>
+          <a:prstGeom prst="rect">
+            <a:avLst/>
+          </a:prstGeom>
+        </p:spPr>
+      </p:pic>
     </p:spTree>
     <p:extLst>
       <p:ext uri="{BB962C8B-B14F-4D97-AF65-F5344CB8AC3E}">
@@ -22621,7 +22656,7 @@
                     <a:effectLst/>
                     <a:latin typeface="IRLotus"/>
                   </a:rPr>
-                  <a:t>متغیرصفرو یکی است که در صورت یکبودن نشان می دهد مرکزداده ی </a:t>
+                  <a:t>متغیرصفرو یکی است که در صورت یک بودن نشان می دهد مرکزداده ی </a:t>
                 </a:r>
                 <a:r>
                   <a:rPr lang="en-US" b="0" i="1" dirty="0">
@@ -22661,7 +22696,7 @@
                     <a:effectLst/>
                     <a:latin typeface="IRLotus"/>
                   </a:rPr>
-                  <a:t>امین برش، منابع فیزیکی اختصاص داده </a:t>
+                  <a:t>امین برش، منابع فیزیکی اختصاص داده است </a:t>
                 </a:r>
                 <a:r>
                   <a:rPr lang="fa-IR" dirty="0"/>
@@ -23989,7 +24024,7 @@
         </p:blipFill>
         <p:spPr>
           <a:xfrm>
-            <a:off x="1726172" y="1461608"/>
+            <a:off x="1621737" y="1476929"/>
             <a:ext cx="2933700" cy="790575"/>
           </a:xfrm>
           <a:prstGeom prst="rect">
@@ -24019,20 +24054,58 @@
         </p:blipFill>
         <p:spPr>
           <a:xfrm>
-            <a:off x="1624572" y="2761349"/>
-            <a:ext cx="2286000" cy="523875"/>
+            <a:off x="1624571" y="2761348"/>
+            <a:ext cx="2589620" cy="593455"/>
           </a:xfrm>
           <a:prstGeom prst="rect">
             <a:avLst/>
           </a:prstGeom>
         </p:spPr>
       </p:pic>
+      <p:sp>
+        <p:nvSpPr>
+          <p:cNvPr id="5" name="Slide Number Placeholder 4">
+            <a:extLst>
+              <a:ext uri="{FF2B5EF4-FFF2-40B4-BE49-F238E27FC236}">
+                <a16:creationId xmlns:a16="http://schemas.microsoft.com/office/drawing/2014/main" id="{416697B4-CC85-4DAE-8350-5C51A34E1C68}"/>
+              </a:ext>
+            </a:extLst>
+          </p:cNvPr>
+          <p:cNvSpPr>
+            <a:spLocks noGrp="1"/>
+          </p:cNvSpPr>
+          <p:nvPr>
+            <p:ph type="sldNum" sz="quarter" idx="12"/>
+          </p:nvPr>
+        </p:nvSpPr>
+        <p:spPr/>
+        <p:txBody>
+          <a:bodyPr/>
+          <a:lstStyle/>
+          <a:p>
+            <a:fld id="{D57F1E4F-1CFF-5643-939E-217C01CDF565}" type="slidenum">
+              <a:rPr lang="en-US" smtClean="0"/>
+              <a:pPr/>
+              <a:t>29</a:t>
+            </a:fld>
+            <a:r>
+              <a:rPr lang="en-US"/>
+              <a:t>/</a:t>
+            </a:r>
+            <a:r>
+              <a:rPr lang="fa-IR"/>
+              <a:t>46</a:t>
+            </a:r>
+            <a:endParaRPr lang="en-US" dirty="0"/>
+          </a:p>
+        </p:txBody>
+      </p:sp>
       <p:pic>
         <p:nvPicPr>
-          <p:cNvPr id="23" name="Picture 22">
+          <p:cNvPr id="4" name="Picture 3">
             <a:extLst>
               <a:ext uri="{FF2B5EF4-FFF2-40B4-BE49-F238E27FC236}">
-                <a16:creationId xmlns:a16="http://schemas.microsoft.com/office/drawing/2014/main" id="{42E3824C-6C57-4C85-8FF3-6CF953CB0AF1}"/>
+                <a16:creationId xmlns:a16="http://schemas.microsoft.com/office/drawing/2014/main" id="{C7015C03-00A1-44E2-A9D3-EF70C298D70F}"/>
               </a:ext>
             </a:extLst>
           </p:cNvPr>
@@ -24049,52 +24122,14 @@
         </p:blipFill>
         <p:spPr>
           <a:xfrm>
-            <a:off x="1624572" y="4320068"/>
-            <a:ext cx="2990850" cy="571500"/>
+            <a:off x="1624571" y="4605817"/>
+            <a:ext cx="5039909" cy="790574"/>
           </a:xfrm>
           <a:prstGeom prst="rect">
             <a:avLst/>
           </a:prstGeom>
         </p:spPr>
       </p:pic>
-      <p:sp>
-        <p:nvSpPr>
-          <p:cNvPr id="5" name="Slide Number Placeholder 4">
-            <a:extLst>
-              <a:ext uri="{FF2B5EF4-FFF2-40B4-BE49-F238E27FC236}">
-                <a16:creationId xmlns:a16="http://schemas.microsoft.com/office/drawing/2014/main" id="{416697B4-CC85-4DAE-8350-5C51A34E1C68}"/>
-              </a:ext>
-            </a:extLst>
-          </p:cNvPr>
-          <p:cNvSpPr>
-            <a:spLocks noGrp="1"/>
-          </p:cNvSpPr>
-          <p:nvPr>
-            <p:ph type="sldNum" sz="quarter" idx="12"/>
-          </p:nvPr>
-        </p:nvSpPr>
-        <p:spPr/>
-        <p:txBody>
-          <a:bodyPr/>
-          <a:lstStyle/>
-          <a:p>
-            <a:fld id="{D57F1E4F-1CFF-5643-939E-217C01CDF565}" type="slidenum">
-              <a:rPr lang="en-US" smtClean="0"/>
-              <a:pPr/>
-              <a:t>29</a:t>
-            </a:fld>
-            <a:r>
-              <a:rPr lang="en-US"/>
-              <a:t>/</a:t>
-            </a:r>
-            <a:r>
-              <a:rPr lang="fa-IR"/>
-              <a:t>46</a:t>
-            </a:r>
-            <a:endParaRPr lang="en-US" dirty="0"/>
-          </a:p>
-        </p:txBody>
-      </p:sp>
     </p:spTree>
     <p:extLst>
       <p:ext uri="{BB962C8B-B14F-4D97-AF65-F5344CB8AC3E}">
@@ -40781,16 +40816,16 @@
               <a:t> شبکه‌های دسترسی رادیویی مجازی</a:t>
             </a:r>
             <a:r>
+              <a:rPr lang="en-US" dirty="0"/>
+              <a:t> </a:t>
+            </a:r>
+            <a:r>
+              <a:rPr lang="en-US" sz="2200" dirty="0"/>
+              <a:t>BBU</a:t>
+            </a:r>
+            <a:r>
               <a:rPr lang="fa-IR" dirty="0"/>
-              <a:t>-</a:t>
-            </a:r>
-            <a:r>
-              <a:rPr lang="en-US" dirty="0"/>
-              <a:t> BBU</a:t>
-            </a:r>
-            <a:r>
-              <a:rPr lang="fa-IR" dirty="0"/>
-              <a:t> مجازی می شود</a:t>
+              <a:t>مجازی می شود</a:t>
             </a:r>
           </a:p>
           <a:p>
@@ -40832,10 +40867,10 @@
           <a:p>
             <a:r>
               <a:rPr lang="ar-IQ" dirty="0"/>
-              <a:t>معماری </a:t>
-            </a:r>
-            <a:r>
-              <a:rPr lang="en-US" dirty="0" err="1"/>
+              <a:t>معماری</a:t>
+            </a:r>
+            <a:r>
+              <a:rPr lang="en-US" sz="2200" dirty="0" err="1"/>
               <a:t>vRAN</a:t>
             </a:r>
             <a:r>
@@ -40843,12 +40878,24 @@
               <a:t> </a:t>
             </a:r>
             <a:r>
+              <a:rPr lang="fa-IR" dirty="0"/>
+              <a:t> </a:t>
+            </a:r>
+            <a:r>
               <a:rPr lang="ar-IQ" dirty="0"/>
-              <a:t>همچنین امکان انتقال اترنت و </a:t>
+              <a:t>همچنین امکان انتقال اترنت و</a:t>
+            </a:r>
+            <a:r>
+              <a:rPr lang="en-US" sz="2200" dirty="0"/>
+              <a:t>IP</a:t>
             </a:r>
             <a:r>
               <a:rPr lang="en-US" dirty="0"/>
-              <a:t>IP </a:t>
+              <a:t> </a:t>
+            </a:r>
+            <a:r>
+              <a:rPr lang="fa-IR" dirty="0"/>
+              <a:t> </a:t>
             </a:r>
             <a:r>
               <a:rPr lang="ar-IQ" dirty="0"/>
@@ -40863,11 +40910,15 @@
               <a:t> که به ارائه‌دهندگان خدمات گزینه‌های مقرون به صرفه‌تری برای انتقال </a:t>
             </a:r>
             <a:r>
-              <a:rPr lang="en-US" dirty="0" err="1"/>
+              <a:rPr lang="en-US" sz="2200" dirty="0"/>
               <a:t>fronthaul</a:t>
             </a:r>
             <a:r>
               <a:rPr lang="en-US" dirty="0"/>
+              <a:t> </a:t>
+            </a:r>
+            <a:r>
+              <a:rPr lang="fa-IR" dirty="0"/>
               <a:t> </a:t>
             </a:r>
             <a:r>

</xml_diff>

<commit_message>
change proposal and ppt12
</commit_message>
<xml_diff>
--- a/Latex/tex1/proposal.pptx
+++ b/Latex/tex1/proposal.pptx
@@ -16911,7 +16911,7 @@
           <a:graphicData uri="http://schemas.openxmlformats.org/presentationml/2006/ole">
             <mc:AlternateContent xmlns:mc="http://schemas.openxmlformats.org/markup-compatibility/2006">
               <mc:Choice xmlns:v="urn:schemas-microsoft-com:vml" Requires="v">
-                <p:oleObj spid="_x0000_s2074" name="PDF" r:id="rId4" imgW="0" imgH="360" progId="FoxitReader.Document">
+                <p:oleObj spid="_x0000_s2076" name="PDF" r:id="rId4" imgW="0" imgH="360" progId="FoxitReader.Document">
                   <p:embed/>
                 </p:oleObj>
               </mc:Choice>
@@ -18878,7 +18878,7 @@
         </p:blipFill>
         <p:spPr>
           <a:xfrm>
-            <a:off x="1310409" y="2442906"/>
+            <a:off x="1542078" y="2442906"/>
             <a:ext cx="2514600" cy="466725"/>
           </a:xfrm>
           <a:prstGeom prst="rect">
@@ -19403,36 +19403,6 @@
           </a:p>
         </p:txBody>
       </p:sp>
-      <p:pic>
-        <p:nvPicPr>
-          <p:cNvPr id="18" name="Picture 17">
-            <a:extLst>
-              <a:ext uri="{FF2B5EF4-FFF2-40B4-BE49-F238E27FC236}">
-                <a16:creationId xmlns:a16="http://schemas.microsoft.com/office/drawing/2014/main" id="{E6C5A48F-3159-4274-B127-CA495F10A71A}"/>
-              </a:ext>
-            </a:extLst>
-          </p:cNvPr>
-          <p:cNvPicPr>
-            <a:picLocks noChangeAspect="1"/>
-          </p:cNvPicPr>
-          <p:nvPr/>
-        </p:nvPicPr>
-        <p:blipFill>
-          <a:blip r:embed="rId8"/>
-          <a:stretch>
-            <a:fillRect/>
-          </a:stretch>
-        </p:blipFill>
-        <p:spPr>
-          <a:xfrm>
-            <a:off x="310949" y="4729758"/>
-            <a:ext cx="6334772" cy="1761147"/>
-          </a:xfrm>
-          <a:prstGeom prst="rect">
-            <a:avLst/>
-          </a:prstGeom>
-        </p:spPr>
-      </p:pic>
       <p:sp>
         <p:nvSpPr>
           <p:cNvPr id="4" name="Slide Number Placeholder 3">
@@ -21847,7 +21817,7 @@
         </p:blipFill>
         <p:spPr>
           <a:xfrm>
-            <a:off x="1460682" y="1223380"/>
+            <a:off x="1670785" y="1121642"/>
             <a:ext cx="3162300" cy="1581150"/>
           </a:xfrm>
           <a:prstGeom prst="rect">
@@ -21877,7 +21847,7 @@
         </p:blipFill>
         <p:spPr>
           <a:xfrm>
-            <a:off x="1480285" y="2818623"/>
+            <a:off x="1670785" y="2714919"/>
             <a:ext cx="3352800" cy="2724150"/>
           </a:xfrm>
           <a:prstGeom prst="rect">
@@ -21969,7 +21939,7 @@
         </p:blipFill>
         <p:spPr>
           <a:xfrm>
-            <a:off x="7080231" y="2944314"/>
+            <a:off x="6985840" y="3124194"/>
             <a:ext cx="2457450" cy="1466850"/>
           </a:xfrm>
           <a:prstGeom prst="rect">
@@ -29257,7 +29227,7 @@
         </p:blipFill>
         <p:spPr>
           <a:xfrm>
-            <a:off x="2340973" y="2568368"/>
+            <a:off x="2205896" y="2588849"/>
             <a:ext cx="631508" cy="647700"/>
           </a:xfrm>
           <a:prstGeom prst="rect">
@@ -29287,7 +29257,7 @@
         </p:blipFill>
         <p:spPr>
           <a:xfrm>
-            <a:off x="4311355" y="2979984"/>
+            <a:off x="4014540" y="3216067"/>
             <a:ext cx="2382814" cy="779830"/>
           </a:xfrm>
           <a:prstGeom prst="rect">
@@ -29317,8 +29287,8 @@
         </p:blipFill>
         <p:spPr>
           <a:xfrm>
-            <a:off x="2656727" y="4394010"/>
-            <a:ext cx="4217060" cy="944960"/>
+            <a:off x="2994990" y="4498627"/>
+            <a:ext cx="3743719" cy="838894"/>
           </a:xfrm>
           <a:prstGeom prst="rect">
             <a:avLst/>
@@ -36515,7 +36485,7 @@
         </p:blipFill>
         <p:spPr>
           <a:xfrm>
-            <a:off x="0" y="3521728"/>
+            <a:off x="738495" y="3409406"/>
             <a:ext cx="4454236" cy="1803054"/>
           </a:xfrm>
           <a:prstGeom prst="rect">
@@ -37032,7 +37002,7 @@
         </p:blipFill>
         <p:spPr>
           <a:xfrm>
-            <a:off x="3040077" y="5155966"/>
+            <a:off x="738495" y="5165510"/>
             <a:ext cx="3183320" cy="1662505"/>
           </a:xfrm>
           <a:prstGeom prst="rect">

</xml_diff>